<commit_message>
Added slides for 7 and 8
</commit_message>
<xml_diff>
--- a/doc/Präsentation.pptx
+++ b/doc/Präsentation.pptx
@@ -15,6 +15,10 @@
     <p:sldId id="263" r:id="rId9"/>
     <p:sldId id="264" r:id="rId10"/>
     <p:sldId id="265" r:id="rId11"/>
+    <p:sldId id="266" r:id="rId12"/>
+    <p:sldId id="267" r:id="rId13"/>
+    <p:sldId id="268" r:id="rId14"/>
+    <p:sldId id="269" r:id="rId15"/>
   </p:sldIdLst>
   <p:sldSz cx="12192000" cy="6858000"/>
   <p:notesSz cx="6858000" cy="9144000"/>
@@ -113,6 +117,11 @@
       </a:defRPr>
     </a:lvl9pPr>
   </p:defaultTextStyle>
+  <p:extLst>
+    <p:ext uri="{EFAFB233-063F-42B5-8137-9DF3F51BA10A}">
+      <p15:sldGuideLst xmlns:p15="http://schemas.microsoft.com/office/powerpoint/2012/main"/>
+    </p:ext>
+  </p:extLst>
 </p:presentation>
 </file>
 
@@ -431,7 +440,7 @@
             <a:fld id="{1449AA12-8195-4182-A7AC-2E7E59DFBDAF}" type="datetimeFigureOut">
               <a:rPr lang="en-US" smtClean="0"/>
               <a:pPr algn="r"/>
-              <a:t>5/2/2023</a:t>
+              <a:t>5/4/2023</a:t>
             </a:fld>
             <a:endParaRPr lang="en-US"/>
           </a:p>
@@ -647,7 +656,7 @@
           <a:p>
             <a:fld id="{1449AA12-8195-4182-A7AC-2E7E59DFBDAF}" type="datetimeFigureOut">
               <a:rPr lang="en-US" smtClean="0"/>
-              <a:t>5/2/2023</a:t>
+              <a:t>5/4/2023</a:t>
             </a:fld>
             <a:endParaRPr lang="en-US"/>
           </a:p>
@@ -1019,7 +1028,7 @@
           <a:p>
             <a:fld id="{1449AA12-8195-4182-A7AC-2E7E59DFBDAF}" type="datetimeFigureOut">
               <a:rPr lang="en-US" smtClean="0"/>
-              <a:t>5/2/2023</a:t>
+              <a:t>5/4/2023</a:t>
             </a:fld>
             <a:endParaRPr lang="en-US"/>
           </a:p>
@@ -1381,7 +1390,7 @@
           <a:p>
             <a:fld id="{1449AA12-8195-4182-A7AC-2E7E59DFBDAF}" type="datetimeFigureOut">
               <a:rPr lang="en-US" smtClean="0"/>
-              <a:t>5/2/2023</a:t>
+              <a:t>5/4/2023</a:t>
             </a:fld>
             <a:endParaRPr lang="en-US"/>
           </a:p>
@@ -1821,7 +1830,7 @@
           <a:p>
             <a:fld id="{1449AA12-8195-4182-A7AC-2E7E59DFBDAF}" type="datetimeFigureOut">
               <a:rPr lang="en-US" smtClean="0"/>
-              <a:t>5/2/2023</a:t>
+              <a:t>5/4/2023</a:t>
             </a:fld>
             <a:endParaRPr lang="en-US"/>
           </a:p>
@@ -2261,7 +2270,7 @@
           <a:p>
             <a:fld id="{1449AA12-8195-4182-A7AC-2E7E59DFBDAF}" type="datetimeFigureOut">
               <a:rPr lang="en-US" smtClean="0"/>
-              <a:t>5/2/2023</a:t>
+              <a:t>5/4/2023</a:t>
             </a:fld>
             <a:endParaRPr lang="en-US"/>
           </a:p>
@@ -2869,7 +2878,7 @@
           <a:p>
             <a:fld id="{1449AA12-8195-4182-A7AC-2E7E59DFBDAF}" type="datetimeFigureOut">
               <a:rPr lang="en-US" smtClean="0"/>
-              <a:t>5/2/2023</a:t>
+              <a:t>5/4/2023</a:t>
             </a:fld>
             <a:endParaRPr lang="en-US"/>
           </a:p>
@@ -3174,7 +3183,7 @@
           <a:p>
             <a:fld id="{1449AA12-8195-4182-A7AC-2E7E59DFBDAF}" type="datetimeFigureOut">
               <a:rPr lang="en-US" smtClean="0"/>
-              <a:t>5/2/2023</a:t>
+              <a:t>5/4/2023</a:t>
             </a:fld>
             <a:endParaRPr lang="en-US"/>
           </a:p>
@@ -3451,7 +3460,7 @@
           <a:p>
             <a:fld id="{1449AA12-8195-4182-A7AC-2E7E59DFBDAF}" type="datetimeFigureOut">
               <a:rPr lang="en-US" smtClean="0"/>
-              <a:t>5/2/2023</a:t>
+              <a:t>5/4/2023</a:t>
             </a:fld>
             <a:endParaRPr lang="en-US"/>
           </a:p>
@@ -3928,7 +3937,7 @@
           <a:p>
             <a:fld id="{1449AA12-8195-4182-A7AC-2E7E59DFBDAF}" type="datetimeFigureOut">
               <a:rPr lang="en-US" smtClean="0"/>
-              <a:t>5/2/2023</a:t>
+              <a:t>5/4/2023</a:t>
             </a:fld>
             <a:endParaRPr lang="en-US"/>
           </a:p>
@@ -4383,7 +4392,7 @@
           <a:p>
             <a:fld id="{1449AA12-8195-4182-A7AC-2E7E59DFBDAF}" type="datetimeFigureOut">
               <a:rPr lang="en-US" smtClean="0"/>
-              <a:t>5/2/2023</a:t>
+              <a:t>5/4/2023</a:t>
             </a:fld>
             <a:endParaRPr lang="en-US"/>
           </a:p>
@@ -4789,7 +4798,7 @@
             <a:fld id="{1449AA12-8195-4182-A7AC-2E7E59DFBDAF}" type="datetimeFigureOut">
               <a:rPr lang="en-US" smtClean="0"/>
               <a:pPr/>
-              <a:t>5/2/2023</a:t>
+              <a:t>5/4/2023</a:t>
             </a:fld>
             <a:endParaRPr lang="en-US"/>
           </a:p>
@@ -5746,7 +5755,7 @@
         </p:blipFill>
         <p:spPr>
           <a:xfrm>
-            <a:off x="1678816" y="3429000"/>
+            <a:off x="1678816" y="3829050"/>
             <a:ext cx="5230645" cy="2650380"/>
           </a:xfrm>
           <a:prstGeom prst="rect">
@@ -5758,6 +5767,795 @@
     <p:extLst>
       <p:ext uri="{BB962C8B-B14F-4D97-AF65-F5344CB8AC3E}">
         <p14:creationId xmlns:p14="http://schemas.microsoft.com/office/powerpoint/2010/main" val="4086062838"/>
+      </p:ext>
+    </p:extLst>
+  </p:cSld>
+  <p:clrMapOvr>
+    <a:masterClrMapping/>
+  </p:clrMapOvr>
+</p:sld>
+</file>
+
+<file path=ppt/slides/slide11.xml><?xml version="1.0" encoding="utf-8"?>
+<p:sld xmlns:a="http://schemas.openxmlformats.org/drawingml/2006/main" xmlns:r="http://schemas.openxmlformats.org/officeDocument/2006/relationships" xmlns:p="http://schemas.openxmlformats.org/presentationml/2006/main">
+  <p:cSld>
+    <p:spTree>
+      <p:nvGrpSpPr>
+        <p:cNvPr id="1" name=""/>
+        <p:cNvGrpSpPr/>
+        <p:nvPr/>
+      </p:nvGrpSpPr>
+      <p:grpSpPr>
+        <a:xfrm>
+          <a:off x="0" y="0"/>
+          <a:ext cx="0" cy="0"/>
+          <a:chOff x="0" y="0"/>
+          <a:chExt cx="0" cy="0"/>
+        </a:xfrm>
+      </p:grpSpPr>
+      <p:sp>
+        <p:nvSpPr>
+          <p:cNvPr id="2" name="Titel 1">
+            <a:extLst>
+              <a:ext uri="{FF2B5EF4-FFF2-40B4-BE49-F238E27FC236}">
+                <a16:creationId xmlns:a16="http://schemas.microsoft.com/office/drawing/2014/main" id="{26CDBC48-04B2-50D1-2CB6-E28C5DFEFFC6}"/>
+              </a:ext>
+            </a:extLst>
+          </p:cNvPr>
+          <p:cNvSpPr>
+            <a:spLocks noGrp="1"/>
+          </p:cNvSpPr>
+          <p:nvPr>
+            <p:ph type="title"/>
+          </p:nvPr>
+        </p:nvSpPr>
+        <p:spPr/>
+        <p:txBody>
+          <a:bodyPr/>
+          <a:lstStyle/>
+          <a:p>
+            <a:r>
+              <a:rPr lang="de-AT" dirty="0"/>
+              <a:t>Heuristische Funktion (1/3)</a:t>
+            </a:r>
+            <a:endParaRPr lang="en-150" dirty="0"/>
+          </a:p>
+        </p:txBody>
+      </p:sp>
+      <p:sp>
+        <p:nvSpPr>
+          <p:cNvPr id="3" name="Inhaltsplatzhalter 2">
+            <a:extLst>
+              <a:ext uri="{FF2B5EF4-FFF2-40B4-BE49-F238E27FC236}">
+                <a16:creationId xmlns:a16="http://schemas.microsoft.com/office/drawing/2014/main" id="{716AB567-2911-2219-0CC7-86CA787FBD6F}"/>
+              </a:ext>
+            </a:extLst>
+          </p:cNvPr>
+          <p:cNvSpPr>
+            <a:spLocks noGrp="1"/>
+          </p:cNvSpPr>
+          <p:nvPr>
+            <p:ph idx="1"/>
+          </p:nvPr>
+        </p:nvSpPr>
+        <p:spPr/>
+        <p:txBody>
+          <a:bodyPr/>
+          <a:lstStyle/>
+          <a:p>
+            <a:r>
+              <a:rPr lang="de-AT" dirty="0"/>
+              <a:t>Drei Variablen mit Gewichtung</a:t>
+            </a:r>
+          </a:p>
+          <a:p>
+            <a:endParaRPr lang="de-AT" dirty="0"/>
+          </a:p>
+          <a:p>
+            <a:endParaRPr lang="de-AT" dirty="0"/>
+          </a:p>
+          <a:p>
+            <a:pPr marL="0" indent="0">
+              <a:buNone/>
+            </a:pPr>
+            <a:endParaRPr lang="de-AT" dirty="0"/>
+          </a:p>
+          <a:p>
+            <a:endParaRPr lang="de-AT" sz="1200" dirty="0"/>
+          </a:p>
+          <a:p>
+            <a:r>
+              <a:rPr lang="de-AT" dirty="0"/>
+              <a:t>Gewichtung per </a:t>
+            </a:r>
+            <a:r>
+              <a:rPr lang="de-AT" dirty="0" err="1"/>
+              <a:t>Bitshift</a:t>
+            </a:r>
+            <a:r>
+              <a:rPr lang="de-AT" dirty="0"/>
+              <a:t> (p1_1 * 1 + p1_2 * 4 + p1_3 * 32)</a:t>
+            </a:r>
+            <a:endParaRPr lang="en-150" dirty="0"/>
+          </a:p>
+        </p:txBody>
+      </p:sp>
+      <p:pic>
+        <p:nvPicPr>
+          <p:cNvPr id="4" name="Grafik 3" descr="Ein Bild, das Text enthält.&#10;&#10;Automatisch generierte Beschreibung">
+            <a:extLst>
+              <a:ext uri="{FF2B5EF4-FFF2-40B4-BE49-F238E27FC236}">
+                <a16:creationId xmlns:a16="http://schemas.microsoft.com/office/drawing/2014/main" id="{196582C0-EB5B-DA16-F5DB-4547E19EA5DA}"/>
+              </a:ext>
+            </a:extLst>
+          </p:cNvPr>
+          <p:cNvPicPr>
+            <a:picLocks noChangeAspect="1"/>
+          </p:cNvPicPr>
+          <p:nvPr/>
+        </p:nvPicPr>
+        <p:blipFill>
+          <a:blip r:embed="rId2"/>
+          <a:stretch>
+            <a:fillRect/>
+          </a:stretch>
+        </p:blipFill>
+        <p:spPr>
+          <a:xfrm>
+            <a:off x="1888248" y="2629208"/>
+            <a:ext cx="7122622" cy="1918356"/>
+          </a:xfrm>
+          <a:prstGeom prst="rect">
+            <a:avLst/>
+          </a:prstGeom>
+        </p:spPr>
+      </p:pic>
+      <p:pic>
+        <p:nvPicPr>
+          <p:cNvPr id="5" name="Grafik 4" descr="Ein Bild, das Text enthält.&#10;&#10;Automatisch generierte Beschreibung">
+            <a:extLst>
+              <a:ext uri="{FF2B5EF4-FFF2-40B4-BE49-F238E27FC236}">
+                <a16:creationId xmlns:a16="http://schemas.microsoft.com/office/drawing/2014/main" id="{329D1940-83CB-4AE6-2925-452149701297}"/>
+              </a:ext>
+            </a:extLst>
+          </p:cNvPr>
+          <p:cNvPicPr>
+            <a:picLocks noChangeAspect="1"/>
+          </p:cNvPicPr>
+          <p:nvPr/>
+        </p:nvPicPr>
+        <p:blipFill>
+          <a:blip r:embed="rId3"/>
+          <a:stretch>
+            <a:fillRect/>
+          </a:stretch>
+        </p:blipFill>
+        <p:spPr>
+          <a:xfrm>
+            <a:off x="1888248" y="5108505"/>
+            <a:ext cx="4800290" cy="977663"/>
+          </a:xfrm>
+          <a:prstGeom prst="rect">
+            <a:avLst/>
+          </a:prstGeom>
+        </p:spPr>
+      </p:pic>
+    </p:spTree>
+    <p:extLst>
+      <p:ext uri="{BB962C8B-B14F-4D97-AF65-F5344CB8AC3E}">
+        <p14:creationId xmlns:p14="http://schemas.microsoft.com/office/powerpoint/2010/main" val="1211586929"/>
+      </p:ext>
+    </p:extLst>
+  </p:cSld>
+  <p:clrMapOvr>
+    <a:masterClrMapping/>
+  </p:clrMapOvr>
+</p:sld>
+</file>
+
+<file path=ppt/slides/slide12.xml><?xml version="1.0" encoding="utf-8"?>
+<p:sld xmlns:a="http://schemas.openxmlformats.org/drawingml/2006/main" xmlns:r="http://schemas.openxmlformats.org/officeDocument/2006/relationships" xmlns:p="http://schemas.openxmlformats.org/presentationml/2006/main">
+  <p:cSld>
+    <p:spTree>
+      <p:nvGrpSpPr>
+        <p:cNvPr id="1" name=""/>
+        <p:cNvGrpSpPr/>
+        <p:nvPr/>
+      </p:nvGrpSpPr>
+      <p:grpSpPr>
+        <a:xfrm>
+          <a:off x="0" y="0"/>
+          <a:ext cx="0" cy="0"/>
+          <a:chOff x="0" y="0"/>
+          <a:chExt cx="0" cy="0"/>
+        </a:xfrm>
+      </p:grpSpPr>
+      <p:sp>
+        <p:nvSpPr>
+          <p:cNvPr id="2" name="Titel 1">
+            <a:extLst>
+              <a:ext uri="{FF2B5EF4-FFF2-40B4-BE49-F238E27FC236}">
+                <a16:creationId xmlns:a16="http://schemas.microsoft.com/office/drawing/2014/main" id="{81BEDF9C-2FC3-6BFC-B5F7-7464FD9B3A1A}"/>
+              </a:ext>
+            </a:extLst>
+          </p:cNvPr>
+          <p:cNvSpPr>
+            <a:spLocks noGrp="1"/>
+          </p:cNvSpPr>
+          <p:nvPr>
+            <p:ph type="title"/>
+          </p:nvPr>
+        </p:nvSpPr>
+        <p:spPr/>
+        <p:txBody>
+          <a:bodyPr/>
+          <a:lstStyle/>
+          <a:p>
+            <a:r>
+              <a:rPr lang="de-AT" dirty="0"/>
+              <a:t>Heuristische Funktion (2/3)</a:t>
+            </a:r>
+            <a:endParaRPr lang="en-150" dirty="0"/>
+          </a:p>
+        </p:txBody>
+      </p:sp>
+      <p:sp>
+        <p:nvSpPr>
+          <p:cNvPr id="3" name="Inhaltsplatzhalter 2">
+            <a:extLst>
+              <a:ext uri="{FF2B5EF4-FFF2-40B4-BE49-F238E27FC236}">
+                <a16:creationId xmlns:a16="http://schemas.microsoft.com/office/drawing/2014/main" id="{A02DFBB1-D136-A34F-7D89-5C025C421B5B}"/>
+              </a:ext>
+            </a:extLst>
+          </p:cNvPr>
+          <p:cNvSpPr>
+            <a:spLocks noGrp="1"/>
+          </p:cNvSpPr>
+          <p:nvPr>
+            <p:ph idx="1"/>
+          </p:nvPr>
+        </p:nvSpPr>
+        <p:spPr>
+          <a:xfrm>
+            <a:off x="1587709" y="2160015"/>
+            <a:ext cx="10437638" cy="4155265"/>
+          </a:xfrm>
+        </p:spPr>
+        <p:txBody>
+          <a:bodyPr>
+            <a:normAutofit fontScale="92500"/>
+          </a:bodyPr>
+          <a:lstStyle/>
+          <a:p>
+            <a:r>
+              <a:rPr lang="de-AT" dirty="0"/>
+              <a:t>Variablen zeigen, wie viele unangefochtene Steine pro C4Row</a:t>
+            </a:r>
+          </a:p>
+          <a:p>
+            <a:endParaRPr lang="de-AT" dirty="0"/>
+          </a:p>
+          <a:p>
+            <a:endParaRPr lang="de-AT" sz="4300" dirty="0"/>
+          </a:p>
+          <a:p>
+            <a:endParaRPr lang="de-AT" dirty="0"/>
+          </a:p>
+          <a:p>
+            <a:endParaRPr lang="de-AT" dirty="0"/>
+          </a:p>
+          <a:p>
+            <a:endParaRPr lang="de-AT" dirty="0"/>
+          </a:p>
+          <a:p>
+            <a:r>
+              <a:rPr lang="de-AT" dirty="0"/>
+              <a:t>Erstes Bild =&gt; 1 Stein für Schwarz; Zweites Bild =&gt; 0 Steine für Schwarz</a:t>
+            </a:r>
+          </a:p>
+          <a:p>
+            <a:r>
+              <a:rPr lang="de-AT" dirty="0"/>
+              <a:t>Daher: Ein Zug beeinflusst viele C4Rows. Position der Steine innerhalb C4Row egal.</a:t>
+            </a:r>
+          </a:p>
+        </p:txBody>
+      </p:sp>
+      <p:pic>
+        <p:nvPicPr>
+          <p:cNvPr id="5" name="Grafik 4">
+            <a:extLst>
+              <a:ext uri="{FF2B5EF4-FFF2-40B4-BE49-F238E27FC236}">
+                <a16:creationId xmlns:a16="http://schemas.microsoft.com/office/drawing/2014/main" id="{44BE4560-0E58-2A08-93D2-72DD09FCB8AF}"/>
+              </a:ext>
+            </a:extLst>
+          </p:cNvPr>
+          <p:cNvPicPr>
+            <a:picLocks noChangeAspect="1"/>
+          </p:cNvPicPr>
+          <p:nvPr/>
+        </p:nvPicPr>
+        <p:blipFill>
+          <a:blip r:embed="rId2"/>
+          <a:stretch>
+            <a:fillRect/>
+          </a:stretch>
+        </p:blipFill>
+        <p:spPr>
+          <a:xfrm>
+            <a:off x="3001422" y="2733246"/>
+            <a:ext cx="2860364" cy="2520000"/>
+          </a:xfrm>
+          <a:prstGeom prst="rect">
+            <a:avLst/>
+          </a:prstGeom>
+        </p:spPr>
+      </p:pic>
+      <p:pic>
+        <p:nvPicPr>
+          <p:cNvPr id="7" name="Grafik 6">
+            <a:extLst>
+              <a:ext uri="{FF2B5EF4-FFF2-40B4-BE49-F238E27FC236}">
+                <a16:creationId xmlns:a16="http://schemas.microsoft.com/office/drawing/2014/main" id="{DDAB62F7-249F-F5D7-652B-4AE6B2978F7B}"/>
+              </a:ext>
+            </a:extLst>
+          </p:cNvPr>
+          <p:cNvPicPr>
+            <a:picLocks noChangeAspect="1"/>
+          </p:cNvPicPr>
+          <p:nvPr/>
+        </p:nvPicPr>
+        <p:blipFill>
+          <a:blip r:embed="rId3"/>
+          <a:stretch>
+            <a:fillRect/>
+          </a:stretch>
+        </p:blipFill>
+        <p:spPr>
+          <a:xfrm>
+            <a:off x="6523655" y="2733246"/>
+            <a:ext cx="2860364" cy="2520000"/>
+          </a:xfrm>
+          <a:prstGeom prst="rect">
+            <a:avLst/>
+          </a:prstGeom>
+        </p:spPr>
+      </p:pic>
+    </p:spTree>
+    <p:extLst>
+      <p:ext uri="{BB962C8B-B14F-4D97-AF65-F5344CB8AC3E}">
+        <p14:creationId xmlns:p14="http://schemas.microsoft.com/office/powerpoint/2010/main" val="2833921060"/>
+      </p:ext>
+    </p:extLst>
+  </p:cSld>
+  <p:clrMapOvr>
+    <a:masterClrMapping/>
+  </p:clrMapOvr>
+</p:sld>
+</file>
+
+<file path=ppt/slides/slide13.xml><?xml version="1.0" encoding="utf-8"?>
+<p:sld xmlns:a="http://schemas.openxmlformats.org/drawingml/2006/main" xmlns:r="http://schemas.openxmlformats.org/officeDocument/2006/relationships" xmlns:p="http://schemas.openxmlformats.org/presentationml/2006/main">
+  <p:cSld>
+    <p:spTree>
+      <p:nvGrpSpPr>
+        <p:cNvPr id="1" name=""/>
+        <p:cNvGrpSpPr/>
+        <p:nvPr/>
+      </p:nvGrpSpPr>
+      <p:grpSpPr>
+        <a:xfrm>
+          <a:off x="0" y="0"/>
+          <a:ext cx="0" cy="0"/>
+          <a:chOff x="0" y="0"/>
+          <a:chExt cx="0" cy="0"/>
+        </a:xfrm>
+      </p:grpSpPr>
+      <p:sp>
+        <p:nvSpPr>
+          <p:cNvPr id="2" name="Titel 1">
+            <a:extLst>
+              <a:ext uri="{FF2B5EF4-FFF2-40B4-BE49-F238E27FC236}">
+                <a16:creationId xmlns:a16="http://schemas.microsoft.com/office/drawing/2014/main" id="{3E40B498-64C6-3B80-6B8E-955C35CA4DD5}"/>
+              </a:ext>
+            </a:extLst>
+          </p:cNvPr>
+          <p:cNvSpPr>
+            <a:spLocks noGrp="1"/>
+          </p:cNvSpPr>
+          <p:nvPr>
+            <p:ph type="title"/>
+          </p:nvPr>
+        </p:nvSpPr>
+        <p:spPr/>
+        <p:txBody>
+          <a:bodyPr/>
+          <a:lstStyle/>
+          <a:p>
+            <a:r>
+              <a:rPr lang="de-AT" dirty="0"/>
+              <a:t>Heuristische Funktion (3/3)</a:t>
+            </a:r>
+            <a:endParaRPr lang="en-150" dirty="0"/>
+          </a:p>
+        </p:txBody>
+      </p:sp>
+      <p:sp>
+        <p:nvSpPr>
+          <p:cNvPr id="3" name="Inhaltsplatzhalter 2">
+            <a:extLst>
+              <a:ext uri="{FF2B5EF4-FFF2-40B4-BE49-F238E27FC236}">
+                <a16:creationId xmlns:a16="http://schemas.microsoft.com/office/drawing/2014/main" id="{FCFD1F2D-186C-9A42-D455-9E818AE33BF9}"/>
+              </a:ext>
+            </a:extLst>
+          </p:cNvPr>
+          <p:cNvSpPr>
+            <a:spLocks noGrp="1"/>
+          </p:cNvSpPr>
+          <p:nvPr>
+            <p:ph idx="1"/>
+          </p:nvPr>
+        </p:nvSpPr>
+        <p:spPr/>
+        <p:txBody>
+          <a:bodyPr/>
+          <a:lstStyle/>
+          <a:p>
+            <a:r>
+              <a:rPr lang="de-AT" dirty="0"/>
+              <a:t>C4Row hat Event </a:t>
+            </a:r>
+            <a:r>
+              <a:rPr lang="de-AT" dirty="0" err="1"/>
+              <a:t>Listener</a:t>
+            </a:r>
+            <a:r>
+              <a:rPr lang="de-AT" dirty="0"/>
+              <a:t> pro Slot</a:t>
+            </a:r>
+          </a:p>
+          <a:p>
+            <a:r>
+              <a:rPr lang="de-AT" dirty="0"/>
+              <a:t>C4Row erfährt, wenn ein Spieler Zug </a:t>
+            </a:r>
+            <a:br>
+              <a:rPr lang="de-AT" dirty="0"/>
+            </a:br>
+            <a:r>
+              <a:rPr lang="de-AT" dirty="0"/>
+              <a:t>bei einem der vier Slots gemacht hat</a:t>
+            </a:r>
+          </a:p>
+          <a:p>
+            <a:r>
+              <a:rPr lang="de-AT" dirty="0"/>
+              <a:t>Je nachdem welcher Spieler =&gt; Update</a:t>
+            </a:r>
+            <a:br>
+              <a:rPr lang="de-AT" dirty="0"/>
+            </a:br>
+            <a:r>
+              <a:rPr lang="de-AT" dirty="0"/>
+              <a:t>in globalem </a:t>
+            </a:r>
+            <a:r>
+              <a:rPr lang="de-AT" dirty="0" err="1"/>
+              <a:t>Stats</a:t>
+            </a:r>
+            <a:r>
+              <a:rPr lang="de-AT" dirty="0"/>
+              <a:t> Objekt</a:t>
+            </a:r>
+          </a:p>
+          <a:p>
+            <a:r>
+              <a:rPr lang="de-AT" dirty="0"/>
+              <a:t>NULL-Player, wenn Spielzug zurückgenommen wird</a:t>
+            </a:r>
+          </a:p>
+          <a:p>
+            <a:r>
+              <a:rPr lang="de-AT" dirty="0"/>
+              <a:t>Daher: Board wird tatsächlich verändert während </a:t>
+            </a:r>
+            <a:br>
+              <a:rPr lang="de-AT" dirty="0"/>
+            </a:br>
+            <a:r>
+              <a:rPr lang="de-AT" dirty="0"/>
+              <a:t>Min-Max-Algorithmus</a:t>
+            </a:r>
+          </a:p>
+          <a:p>
+            <a:endParaRPr lang="en-150" dirty="0"/>
+          </a:p>
+        </p:txBody>
+      </p:sp>
+      <p:pic>
+        <p:nvPicPr>
+          <p:cNvPr id="7" name="Grafik 6">
+            <a:extLst>
+              <a:ext uri="{FF2B5EF4-FFF2-40B4-BE49-F238E27FC236}">
+                <a16:creationId xmlns:a16="http://schemas.microsoft.com/office/drawing/2014/main" id="{A7CEF1A3-6C8D-A5AC-4D00-C4A32947AF92}"/>
+              </a:ext>
+            </a:extLst>
+          </p:cNvPr>
+          <p:cNvPicPr>
+            <a:picLocks noChangeAspect="1"/>
+          </p:cNvPicPr>
+          <p:nvPr/>
+        </p:nvPicPr>
+        <p:blipFill>
+          <a:blip r:embed="rId2"/>
+          <a:stretch>
+            <a:fillRect/>
+          </a:stretch>
+        </p:blipFill>
+        <p:spPr>
+          <a:xfrm>
+            <a:off x="7290519" y="1530437"/>
+            <a:ext cx="4473248" cy="2360553"/>
+          </a:xfrm>
+          <a:prstGeom prst="rect">
+            <a:avLst/>
+          </a:prstGeom>
+        </p:spPr>
+      </p:pic>
+      <p:pic>
+        <p:nvPicPr>
+          <p:cNvPr id="9" name="Grafik 8">
+            <a:extLst>
+              <a:ext uri="{FF2B5EF4-FFF2-40B4-BE49-F238E27FC236}">
+                <a16:creationId xmlns:a16="http://schemas.microsoft.com/office/drawing/2014/main" id="{D65F26C5-4127-807E-A329-2703B29CC25B}"/>
+              </a:ext>
+            </a:extLst>
+          </p:cNvPr>
+          <p:cNvPicPr>
+            <a:picLocks noChangeAspect="1"/>
+          </p:cNvPicPr>
+          <p:nvPr/>
+        </p:nvPicPr>
+        <p:blipFill>
+          <a:blip r:embed="rId3"/>
+          <a:stretch>
+            <a:fillRect/>
+          </a:stretch>
+        </p:blipFill>
+        <p:spPr>
+          <a:xfrm>
+            <a:off x="5478144" y="4111010"/>
+            <a:ext cx="6278926" cy="322302"/>
+          </a:xfrm>
+          <a:prstGeom prst="rect">
+            <a:avLst/>
+          </a:prstGeom>
+        </p:spPr>
+      </p:pic>
+    </p:spTree>
+    <p:extLst>
+      <p:ext uri="{BB962C8B-B14F-4D97-AF65-F5344CB8AC3E}">
+        <p14:creationId xmlns:p14="http://schemas.microsoft.com/office/powerpoint/2010/main" val="2318146781"/>
+      </p:ext>
+    </p:extLst>
+  </p:cSld>
+  <p:clrMapOvr>
+    <a:masterClrMapping/>
+  </p:clrMapOvr>
+</p:sld>
+</file>
+
+<file path=ppt/slides/slide14.xml><?xml version="1.0" encoding="utf-8"?>
+<p:sld xmlns:a="http://schemas.openxmlformats.org/drawingml/2006/main" xmlns:r="http://schemas.openxmlformats.org/officeDocument/2006/relationships" xmlns:p="http://schemas.openxmlformats.org/presentationml/2006/main">
+  <p:cSld>
+    <p:spTree>
+      <p:nvGrpSpPr>
+        <p:cNvPr id="1" name=""/>
+        <p:cNvGrpSpPr/>
+        <p:nvPr/>
+      </p:nvGrpSpPr>
+      <p:grpSpPr>
+        <a:xfrm>
+          <a:off x="0" y="0"/>
+          <a:ext cx="0" cy="0"/>
+          <a:chOff x="0" y="0"/>
+          <a:chExt cx="0" cy="0"/>
+        </a:xfrm>
+      </p:grpSpPr>
+      <p:sp>
+        <p:nvSpPr>
+          <p:cNvPr id="2" name="Titel 1">
+            <a:extLst>
+              <a:ext uri="{FF2B5EF4-FFF2-40B4-BE49-F238E27FC236}">
+                <a16:creationId xmlns:a16="http://schemas.microsoft.com/office/drawing/2014/main" id="{BEEA3DA4-1A70-FC9A-0896-839B31C3340E}"/>
+              </a:ext>
+            </a:extLst>
+          </p:cNvPr>
+          <p:cNvSpPr>
+            <a:spLocks noGrp="1"/>
+          </p:cNvSpPr>
+          <p:nvPr>
+            <p:ph type="title"/>
+          </p:nvPr>
+        </p:nvSpPr>
+        <p:spPr/>
+        <p:txBody>
+          <a:bodyPr/>
+          <a:lstStyle/>
+          <a:p>
+            <a:r>
+              <a:rPr lang="de-AT" dirty="0" err="1"/>
+              <a:t>When</a:t>
+            </a:r>
+            <a:r>
+              <a:rPr lang="de-AT" dirty="0"/>
+              <a:t> </a:t>
+            </a:r>
+            <a:r>
+              <a:rPr lang="de-AT" dirty="0" err="1"/>
+              <a:t>the</a:t>
+            </a:r>
+            <a:r>
+              <a:rPr lang="de-AT" dirty="0"/>
+              <a:t> AI </a:t>
+            </a:r>
+            <a:r>
+              <a:rPr lang="de-AT" dirty="0" err="1"/>
+              <a:t>plays</a:t>
+            </a:r>
+            <a:r>
+              <a:rPr lang="de-AT" dirty="0"/>
+              <a:t> </a:t>
+            </a:r>
+            <a:r>
+              <a:rPr lang="de-AT" dirty="0" err="1"/>
+              <a:t>with</a:t>
+            </a:r>
+            <a:r>
+              <a:rPr lang="de-AT" dirty="0"/>
+              <a:t> </a:t>
+            </a:r>
+            <a:r>
+              <a:rPr lang="de-AT" dirty="0" err="1"/>
+              <a:t>its</a:t>
+            </a:r>
+            <a:r>
+              <a:rPr lang="de-AT" dirty="0"/>
+              <a:t> </a:t>
+            </a:r>
+            <a:r>
+              <a:rPr lang="de-AT" dirty="0" err="1"/>
+              <a:t>food</a:t>
+            </a:r>
+            <a:r>
+              <a:rPr lang="de-AT" dirty="0"/>
+              <a:t>…</a:t>
+            </a:r>
+            <a:endParaRPr lang="en-150" dirty="0"/>
+          </a:p>
+        </p:txBody>
+      </p:sp>
+      <p:sp>
+        <p:nvSpPr>
+          <p:cNvPr id="3" name="Inhaltsplatzhalter 2">
+            <a:extLst>
+              <a:ext uri="{FF2B5EF4-FFF2-40B4-BE49-F238E27FC236}">
+                <a16:creationId xmlns:a16="http://schemas.microsoft.com/office/drawing/2014/main" id="{38B71BFD-6B86-C6A0-D832-AAFE45AC522E}"/>
+              </a:ext>
+            </a:extLst>
+          </p:cNvPr>
+          <p:cNvSpPr>
+            <a:spLocks noGrp="1"/>
+          </p:cNvSpPr>
+          <p:nvPr>
+            <p:ph idx="1"/>
+          </p:nvPr>
+        </p:nvSpPr>
+        <p:spPr/>
+        <p:txBody>
+          <a:bodyPr>
+            <a:normAutofit lnSpcReduction="10000"/>
+          </a:bodyPr>
+          <a:lstStyle/>
+          <a:p>
+            <a:r>
+              <a:rPr lang="de-AT" dirty="0"/>
+              <a:t>Gegeben sei folgende Position (links). Der rote Spieler ist am Zug:</a:t>
+            </a:r>
+          </a:p>
+          <a:p>
+            <a:endParaRPr lang="de-AT" dirty="0"/>
+          </a:p>
+          <a:p>
+            <a:endParaRPr lang="de-AT" dirty="0"/>
+          </a:p>
+          <a:p>
+            <a:endParaRPr lang="de-AT" dirty="0"/>
+          </a:p>
+          <a:p>
+            <a:endParaRPr lang="de-AT" dirty="0"/>
+          </a:p>
+          <a:p>
+            <a:endParaRPr lang="de-AT" dirty="0"/>
+          </a:p>
+          <a:p>
+            <a:endParaRPr lang="de-AT" dirty="0"/>
+          </a:p>
+          <a:p>
+            <a:r>
+              <a:rPr lang="de-AT" dirty="0"/>
+              <a:t>Die KI könnte in einem Zug gewinnen. Tut sie aber nicht (rechtes Bild) </a:t>
+            </a:r>
+          </a:p>
+          <a:p>
+            <a:endParaRPr lang="en-150" dirty="0"/>
+          </a:p>
+        </p:txBody>
+      </p:sp>
+      <p:pic>
+        <p:nvPicPr>
+          <p:cNvPr id="4" name="Grafik 3" descr="Ein Bild, das Screenshot, Kreis, Rechteck, Design enthält.&#10;&#10;Automatisch generierte Beschreibung">
+            <a:extLst>
+              <a:ext uri="{FF2B5EF4-FFF2-40B4-BE49-F238E27FC236}">
+                <a16:creationId xmlns:a16="http://schemas.microsoft.com/office/drawing/2014/main" id="{AA7FC1D8-BB4F-D80B-0DE6-069E7D3F7AA9}"/>
+              </a:ext>
+            </a:extLst>
+          </p:cNvPr>
+          <p:cNvPicPr>
+            <a:picLocks noChangeAspect="1"/>
+          </p:cNvPicPr>
+          <p:nvPr/>
+        </p:nvPicPr>
+        <p:blipFill>
+          <a:blip r:embed="rId2"/>
+          <a:stretch>
+            <a:fillRect/>
+          </a:stretch>
+        </p:blipFill>
+        <p:spPr>
+          <a:xfrm>
+            <a:off x="2330778" y="2638219"/>
+            <a:ext cx="3181680" cy="2769240"/>
+          </a:xfrm>
+          <a:prstGeom prst="rect">
+            <a:avLst/>
+          </a:prstGeom>
+        </p:spPr>
+      </p:pic>
+      <p:pic>
+        <p:nvPicPr>
+          <p:cNvPr id="5" name="Grafik 4" descr="Ein Bild, das Screenshot, Kreis, Rechteck, Farbigkeit enthält.&#10;&#10;Automatisch generierte Beschreibung">
+            <a:extLst>
+              <a:ext uri="{FF2B5EF4-FFF2-40B4-BE49-F238E27FC236}">
+                <a16:creationId xmlns:a16="http://schemas.microsoft.com/office/drawing/2014/main" id="{FF24063B-3491-6FB2-5EE3-4A73E517EE64}"/>
+              </a:ext>
+            </a:extLst>
+          </p:cNvPr>
+          <p:cNvPicPr>
+            <a:picLocks noChangeAspect="1"/>
+          </p:cNvPicPr>
+          <p:nvPr/>
+        </p:nvPicPr>
+        <p:blipFill>
+          <a:blip r:embed="rId3"/>
+          <a:stretch>
+            <a:fillRect/>
+          </a:stretch>
+        </p:blipFill>
+        <p:spPr>
+          <a:xfrm>
+            <a:off x="6255526" y="2638219"/>
+            <a:ext cx="3181680" cy="2769240"/>
+          </a:xfrm>
+          <a:prstGeom prst="rect">
+            <a:avLst/>
+          </a:prstGeom>
+        </p:spPr>
+      </p:pic>
+    </p:spTree>
+    <p:extLst>
+      <p:ext uri="{BB962C8B-B14F-4D97-AF65-F5344CB8AC3E}">
+        <p14:creationId xmlns:p14="http://schemas.microsoft.com/office/powerpoint/2010/main" val="2173718380"/>
       </p:ext>
     </p:extLst>
   </p:cSld>

</xml_diff>

<commit_message>
Added slide for last task
</commit_message>
<xml_diff>
--- a/doc/Präsentation.pptx
+++ b/doc/Präsentation.pptx
@@ -19,6 +19,7 @@
     <p:sldId id="267" r:id="rId13"/>
     <p:sldId id="268" r:id="rId14"/>
     <p:sldId id="269" r:id="rId15"/>
+    <p:sldId id="270" r:id="rId16"/>
   </p:sldIdLst>
   <p:sldSz cx="12192000" cy="6858000"/>
   <p:notesSz cx="6858000" cy="9144000"/>
@@ -6565,6 +6566,199 @@
 </p:sld>
 </file>
 
+<file path=ppt/slides/slide15.xml><?xml version="1.0" encoding="utf-8"?>
+<p:sld xmlns:a="http://schemas.openxmlformats.org/drawingml/2006/main" xmlns:r="http://schemas.openxmlformats.org/officeDocument/2006/relationships" xmlns:p="http://schemas.openxmlformats.org/presentationml/2006/main">
+  <p:cSld>
+    <p:spTree>
+      <p:nvGrpSpPr>
+        <p:cNvPr id="1" name=""/>
+        <p:cNvGrpSpPr/>
+        <p:nvPr/>
+      </p:nvGrpSpPr>
+      <p:grpSpPr>
+        <a:xfrm>
+          <a:off x="0" y="0"/>
+          <a:ext cx="0" cy="0"/>
+          <a:chOff x="0" y="0"/>
+          <a:chExt cx="0" cy="0"/>
+        </a:xfrm>
+      </p:grpSpPr>
+      <p:sp>
+        <p:nvSpPr>
+          <p:cNvPr id="2" name="Titel 1">
+            <a:extLst>
+              <a:ext uri="{FF2B5EF4-FFF2-40B4-BE49-F238E27FC236}">
+                <a16:creationId xmlns:a16="http://schemas.microsoft.com/office/drawing/2014/main" id="{7A152D02-9FDE-8F68-CEC0-153A43ECD60B}"/>
+              </a:ext>
+            </a:extLst>
+          </p:cNvPr>
+          <p:cNvSpPr>
+            <a:spLocks noGrp="1"/>
+          </p:cNvSpPr>
+          <p:nvPr>
+            <p:ph type="title"/>
+          </p:nvPr>
+        </p:nvSpPr>
+        <p:spPr/>
+        <p:txBody>
+          <a:bodyPr/>
+          <a:lstStyle/>
+          <a:p>
+            <a:r>
+              <a:rPr lang="de-AT" dirty="0" err="1"/>
+              <a:t>When</a:t>
+            </a:r>
+            <a:r>
+              <a:rPr lang="de-AT" dirty="0"/>
+              <a:t> </a:t>
+            </a:r>
+            <a:r>
+              <a:rPr lang="de-AT" dirty="0" err="1"/>
+              <a:t>the</a:t>
+            </a:r>
+            <a:r>
+              <a:rPr lang="de-AT" dirty="0"/>
+              <a:t> AI </a:t>
+            </a:r>
+            <a:r>
+              <a:rPr lang="de-AT" dirty="0" err="1"/>
+              <a:t>plays</a:t>
+            </a:r>
+            <a:r>
+              <a:rPr lang="de-AT" dirty="0"/>
+              <a:t> </a:t>
+            </a:r>
+            <a:r>
+              <a:rPr lang="de-AT" dirty="0" err="1"/>
+              <a:t>with</a:t>
+            </a:r>
+            <a:r>
+              <a:rPr lang="de-AT" dirty="0"/>
+              <a:t> </a:t>
+            </a:r>
+            <a:r>
+              <a:rPr lang="de-AT" dirty="0" err="1"/>
+              <a:t>its</a:t>
+            </a:r>
+            <a:r>
+              <a:rPr lang="de-AT" dirty="0"/>
+              <a:t> </a:t>
+            </a:r>
+            <a:r>
+              <a:rPr lang="de-AT" dirty="0" err="1"/>
+              <a:t>food</a:t>
+            </a:r>
+            <a:r>
+              <a:rPr lang="de-AT" dirty="0"/>
+              <a:t>…</a:t>
+            </a:r>
+            <a:endParaRPr lang="en-150" dirty="0"/>
+          </a:p>
+        </p:txBody>
+      </p:sp>
+      <p:sp>
+        <p:nvSpPr>
+          <p:cNvPr id="3" name="Inhaltsplatzhalter 2">
+            <a:extLst>
+              <a:ext uri="{FF2B5EF4-FFF2-40B4-BE49-F238E27FC236}">
+                <a16:creationId xmlns:a16="http://schemas.microsoft.com/office/drawing/2014/main" id="{D977AD48-62A2-BB84-04DC-5578F7FF8BC5}"/>
+              </a:ext>
+            </a:extLst>
+          </p:cNvPr>
+          <p:cNvSpPr>
+            <a:spLocks noGrp="1"/>
+          </p:cNvSpPr>
+          <p:nvPr>
+            <p:ph idx="1"/>
+          </p:nvPr>
+        </p:nvSpPr>
+        <p:spPr/>
+        <p:txBody>
+          <a:bodyPr>
+            <a:normAutofit lnSpcReduction="10000"/>
+          </a:bodyPr>
+          <a:lstStyle/>
+          <a:p>
+            <a:r>
+              <a:rPr lang="de-AT" dirty="0"/>
+              <a:t>Als nächstes blockiert der schwarze Spieler eine Kette:</a:t>
+            </a:r>
+          </a:p>
+          <a:p>
+            <a:endParaRPr lang="de-AT" dirty="0"/>
+          </a:p>
+          <a:p>
+            <a:endParaRPr lang="de-AT" dirty="0"/>
+          </a:p>
+          <a:p>
+            <a:endParaRPr lang="de-AT" dirty="0"/>
+          </a:p>
+          <a:p>
+            <a:endParaRPr lang="de-AT" dirty="0"/>
+          </a:p>
+          <a:p>
+            <a:endParaRPr lang="de-AT" dirty="0"/>
+          </a:p>
+          <a:p>
+            <a:r>
+              <a:rPr lang="de-AT" dirty="0"/>
+              <a:t>Jetzt kann der rote Spieler immer noch gewinnen</a:t>
+            </a:r>
+          </a:p>
+          <a:p>
+            <a:r>
+              <a:rPr lang="de-AT" dirty="0"/>
+              <a:t>Daher: Letzter Spielzug spielte nicht wirklich eine Rolle</a:t>
+            </a:r>
+          </a:p>
+          <a:p>
+            <a:endParaRPr lang="en-150" dirty="0"/>
+          </a:p>
+        </p:txBody>
+      </p:sp>
+      <p:pic>
+        <p:nvPicPr>
+          <p:cNvPr id="4" name="Grafik 3" descr="Ein Bild, das Screenshot, Kreis, Farbigkeit, Rechteck enthält.&#10;&#10;Automatisch generierte Beschreibung">
+            <a:extLst>
+              <a:ext uri="{FF2B5EF4-FFF2-40B4-BE49-F238E27FC236}">
+                <a16:creationId xmlns:a16="http://schemas.microsoft.com/office/drawing/2014/main" id="{2F248E5B-678A-71B5-0860-AC5DC0181897}"/>
+              </a:ext>
+            </a:extLst>
+          </p:cNvPr>
+          <p:cNvPicPr>
+            <a:picLocks noChangeAspect="1"/>
+          </p:cNvPicPr>
+          <p:nvPr/>
+        </p:nvPicPr>
+        <p:blipFill>
+          <a:blip r:embed="rId2"/>
+          <a:stretch>
+            <a:fillRect/>
+          </a:stretch>
+        </p:blipFill>
+        <p:spPr>
+          <a:xfrm>
+            <a:off x="1874301" y="2664534"/>
+            <a:ext cx="2750327" cy="2393803"/>
+          </a:xfrm>
+          <a:prstGeom prst="rect">
+            <a:avLst/>
+          </a:prstGeom>
+        </p:spPr>
+      </p:pic>
+    </p:spTree>
+    <p:extLst>
+      <p:ext uri="{BB962C8B-B14F-4D97-AF65-F5344CB8AC3E}">
+        <p14:creationId xmlns:p14="http://schemas.microsoft.com/office/powerpoint/2010/main" val="2495668979"/>
+      </p:ext>
+    </p:extLst>
+  </p:cSld>
+  <p:clrMapOvr>
+    <a:masterClrMapping/>
+  </p:clrMapOvr>
+</p:sld>
+</file>
+
 <file path=ppt/slides/slide2.xml><?xml version="1.0" encoding="utf-8"?>
 <p:sld xmlns:a="http://schemas.openxmlformats.org/drawingml/2006/main" xmlns:r="http://schemas.openxmlformats.org/officeDocument/2006/relationships" xmlns:p="http://schemas.openxmlformats.org/presentationml/2006/main">
   <p:cSld>

</xml_diff>

<commit_message>
dok und präsentation: nr 4 ergänzt
</commit_message>
<xml_diff>
--- a/doc/Präsentation.pptx
+++ b/doc/Präsentation.pptx
@@ -8739,12 +8739,12 @@
                         </a:spcAft>
                       </a:pPr>
                       <a:r>
-                        <a:rPr lang="de-AT" sz="1800">
+                        <a:rPr lang="de-AT" sz="1800" dirty="0">
                           <a:effectLst/>
                         </a:rPr>
                         <a:t>2007</a:t>
                       </a:r>
-                      <a:endParaRPr lang="de-AT" sz="1800">
+                      <a:endParaRPr lang="de-AT" sz="1800" dirty="0">
                         <a:effectLst/>
                         <a:latin typeface="Calibri" panose="020F0502020204030204" pitchFamily="34" charset="0"/>
                         <a:ea typeface="Calibri" panose="020F0502020204030204" pitchFamily="34" charset="0"/>
@@ -10111,12 +10111,12 @@
                         </a:spcAft>
                       </a:pPr>
                       <a:r>
-                        <a:rPr lang="de-AT" sz="1100">
+                        <a:rPr lang="de-AT" sz="1100" dirty="0">
                           <a:effectLst/>
                         </a:rPr>
                         <a:t>4680</a:t>
                       </a:r>
-                      <a:endParaRPr lang="de-AT" sz="1100">
+                      <a:endParaRPr lang="de-AT" sz="1100" dirty="0">
                         <a:effectLst/>
                         <a:latin typeface="Calibri" panose="020F0502020204030204" pitchFamily="34" charset="0"/>
                         <a:ea typeface="Calibri" panose="020F0502020204030204" pitchFamily="34" charset="0"/>
@@ -12786,7 +12786,11 @@
           <a:p>
             <a:r>
               <a:rPr lang="de-DE" dirty="0"/>
-              <a:t>Punkt 4 TODO</a:t>
+              <a:t>Deep </a:t>
+            </a:r>
+            <a:r>
+              <a:rPr lang="de-DE" dirty="0" err="1"/>
+              <a:t>pruning</a:t>
             </a:r>
             <a:endParaRPr lang="de-AT" dirty="0"/>
           </a:p>
@@ -12808,15 +12812,131 @@
             <p:ph idx="1"/>
           </p:nvPr>
         </p:nvSpPr>
-        <p:spPr/>
+        <p:spPr>
+          <a:xfrm>
+            <a:off x="1352655" y="1579913"/>
+            <a:ext cx="5618416" cy="3926152"/>
+          </a:xfrm>
+        </p:spPr>
         <p:txBody>
           <a:bodyPr/>
           <a:lstStyle/>
           <a:p>
-            <a:endParaRPr lang="de-AT"/>
+            <a:r>
+              <a:rPr lang="de-AT" dirty="0"/>
+              <a:t>Die Methoden </a:t>
+            </a:r>
+            <a:r>
+              <a:rPr lang="de-AT" dirty="0" err="1"/>
+              <a:t>expandMaxNode</a:t>
+            </a:r>
+            <a:r>
+              <a:rPr lang="de-AT" dirty="0"/>
+              <a:t> </a:t>
+            </a:r>
+            <a:br>
+              <a:rPr lang="de-AT" dirty="0"/>
+            </a:br>
+            <a:r>
+              <a:rPr lang="de-AT" dirty="0"/>
+              <a:t>und </a:t>
+            </a:r>
+            <a:r>
+              <a:rPr lang="de-AT" dirty="0" err="1"/>
+              <a:t>expandMinNode</a:t>
+            </a:r>
+            <a:r>
+              <a:rPr lang="de-AT" dirty="0"/>
+              <a:t> wurden erweitert</a:t>
+            </a:r>
+          </a:p>
+          <a:p>
+            <a:r>
+              <a:rPr lang="de-AT" dirty="0"/>
+              <a:t>Neue Parameter: </a:t>
+            </a:r>
+            <a:r>
+              <a:rPr lang="de-AT" dirty="0" err="1"/>
+              <a:t>alpha</a:t>
+            </a:r>
+            <a:r>
+              <a:rPr lang="de-AT" dirty="0"/>
+              <a:t>, </a:t>
+            </a:r>
+            <a:r>
+              <a:rPr lang="de-AT" dirty="0" err="1"/>
+              <a:t>beta</a:t>
+            </a:r>
+            <a:endParaRPr lang="de-AT" dirty="0"/>
+          </a:p>
+          <a:p>
+            <a:r>
+              <a:rPr lang="de-AT" dirty="0"/>
+              <a:t>Neue Abbruchbedingung</a:t>
+            </a:r>
           </a:p>
         </p:txBody>
       </p:sp>
+      <p:pic>
+        <p:nvPicPr>
+          <p:cNvPr id="5" name="Grafik 4">
+            <a:extLst>
+              <a:ext uri="{FF2B5EF4-FFF2-40B4-BE49-F238E27FC236}">
+                <a16:creationId xmlns:a16="http://schemas.microsoft.com/office/drawing/2014/main" id="{CD18A8E4-839E-F2E4-AB4A-02C73D08AA0B}"/>
+              </a:ext>
+            </a:extLst>
+          </p:cNvPr>
+          <p:cNvPicPr>
+            <a:picLocks noChangeAspect="1"/>
+          </p:cNvPicPr>
+          <p:nvPr/>
+        </p:nvPicPr>
+        <p:blipFill>
+          <a:blip r:embed="rId2"/>
+          <a:stretch>
+            <a:fillRect/>
+          </a:stretch>
+        </p:blipFill>
+        <p:spPr>
+          <a:xfrm>
+            <a:off x="7206126" y="611435"/>
+            <a:ext cx="4733326" cy="5494397"/>
+          </a:xfrm>
+          <a:prstGeom prst="rect">
+            <a:avLst/>
+          </a:prstGeom>
+        </p:spPr>
+      </p:pic>
+      <p:pic>
+        <p:nvPicPr>
+          <p:cNvPr id="7" name="Grafik 6">
+            <a:extLst>
+              <a:ext uri="{FF2B5EF4-FFF2-40B4-BE49-F238E27FC236}">
+                <a16:creationId xmlns:a16="http://schemas.microsoft.com/office/drawing/2014/main" id="{4DB10E9A-889A-D95A-7044-1685EB36AAEE}"/>
+              </a:ext>
+            </a:extLst>
+          </p:cNvPr>
+          <p:cNvPicPr>
+            <a:picLocks noChangeAspect="1"/>
+          </p:cNvPicPr>
+          <p:nvPr/>
+        </p:nvPicPr>
+        <p:blipFill>
+          <a:blip r:embed="rId3"/>
+          <a:stretch>
+            <a:fillRect/>
+          </a:stretch>
+        </p:blipFill>
+        <p:spPr>
+          <a:xfrm>
+            <a:off x="1352655" y="4620622"/>
+            <a:ext cx="5311600" cy="1097375"/>
+          </a:xfrm>
+          <a:prstGeom prst="rect">
+            <a:avLst/>
+          </a:prstGeom>
+        </p:spPr>
+      </p:pic>
     </p:spTree>
     <p:extLst>
       <p:ext uri="{BB962C8B-B14F-4D97-AF65-F5344CB8AC3E}">

</xml_diff>